<commit_message>
shifted 'progress report' block
</commit_message>
<xml_diff>
--- a/poster.pptx
+++ b/poster.pptx
@@ -192,7 +192,7 @@
           <a:bodyPr lIns="0" rIns="0" tIns="0" bIns="0" anchor="b"/>
           <a:p>
             <a:pPr algn="r"/>
-            <a:fld id="{88FC1CCB-C9DA-422F-A468-12B9BE1E66D0}" type="slidenum">
+            <a:fld id="{EDB44EF4-F34F-422A-ADED-349C24EB0097}" type="slidenum">
               <a:rPr b="0" lang="en-US" sz="1400" spc="-1" strike="noStrike">
                 <a:latin typeface="Times New Roman"/>
               </a:rPr>
@@ -240,7 +240,7 @@
         <p:spPr>
           <a:xfrm>
             <a:off x="679320" y="4779360"/>
-            <a:ext cx="5432760" cy="3907440"/>
+            <a:ext cx="5432400" cy="3907080"/>
           </a:xfrm>
           <a:prstGeom prst="rect">
             <a:avLst/>
@@ -264,7 +264,7 @@
         <p:spPr>
           <a:xfrm>
             <a:off x="3848760" y="9433080"/>
-            <a:ext cx="2941560" cy="495360"/>
+            <a:ext cx="2941200" cy="495000"/>
           </a:xfrm>
           <a:prstGeom prst="rect">
             <a:avLst/>
@@ -288,7 +288,7 @@
                 <a:spcPct val="100000"/>
               </a:lnSpc>
             </a:pPr>
-            <a:fld id="{7B8803F3-C930-4EBF-B862-1709A026E70C}" type="slidenum">
+            <a:fld id="{39FD96EC-9FB1-4925-93AF-4FF3A7602AD1}" type="slidenum">
               <a:rPr b="0" lang="en-US" sz="1200" spc="-1" strike="noStrike">
                 <a:solidFill>
                   <a:srgbClr val="000000"/>
@@ -296,7 +296,7 @@
                 <a:latin typeface="+mn-lt"/>
                 <a:ea typeface="+mn-ea"/>
               </a:rPr>
-              <a:t>&lt;number&gt;</a:t>
+              <a:t>1</a:t>
             </a:fld>
             <a:endParaRPr b="0" lang="en-US" sz="1200" spc="-1" strike="noStrike">
               <a:latin typeface="Arial"/>
@@ -1692,7 +1692,13 @@
               <a:rPr b="0" lang="en-US" sz="4400" spc="-1" strike="noStrike">
                 <a:latin typeface="Arial"/>
               </a:rPr>
-              <a:t>Click to edit the title text format</a:t>
+              <a:t>Click to edit the title </a:t>
+            </a:r>
+            <a:r>
+              <a:rPr b="0" lang="en-US" sz="4400" spc="-1" strike="noStrike">
+                <a:latin typeface="Arial"/>
+              </a:rPr>
+              <a:t>text format</a:t>
             </a:r>
             <a:endParaRPr b="0" lang="en-US" sz="4400" spc="-1" strike="noStrike">
               <a:latin typeface="Arial"/>
@@ -1929,7 +1935,7 @@
         <p:spPr>
           <a:xfrm>
             <a:off x="20160" y="41035320"/>
-            <a:ext cx="30272400" cy="1765440"/>
+            <a:ext cx="30272040" cy="1765080"/>
           </a:xfrm>
           <a:prstGeom prst="rect">
             <a:avLst/>
@@ -1948,7 +1954,7 @@
         <p:spPr>
           <a:xfrm>
             <a:off x="0" y="2956680"/>
-            <a:ext cx="30273120" cy="5397120"/>
+            <a:ext cx="30272760" cy="5396760"/>
           </a:xfrm>
           <a:prstGeom prst="rect">
             <a:avLst/>
@@ -2116,7 +2122,7 @@
         <p:spPr>
           <a:xfrm>
             <a:off x="8213400" y="41428080"/>
-            <a:ext cx="5096880" cy="1103040"/>
+            <a:ext cx="5096520" cy="1102680"/>
           </a:xfrm>
           <a:prstGeom prst="rect">
             <a:avLst/>
@@ -2189,7 +2195,7 @@
         <p:spPr>
           <a:xfrm>
             <a:off x="7986960" y="41275800"/>
-            <a:ext cx="1141920" cy="1004040"/>
+            <a:ext cx="1141560" cy="1003680"/>
           </a:xfrm>
           <a:prstGeom prst="rect">
             <a:avLst/>
@@ -2422,7 +2428,7 @@
         <p:spPr>
           <a:xfrm>
             <a:off x="1547640" y="519840"/>
-            <a:ext cx="7821720" cy="2056680"/>
+            <a:ext cx="7821360" cy="2056320"/>
           </a:xfrm>
           <a:prstGeom prst="rect">
             <a:avLst/>
@@ -2441,7 +2447,7 @@
         <p:spPr>
           <a:xfrm>
             <a:off x="1353960" y="6780600"/>
-            <a:ext cx="27447120" cy="1306800"/>
+            <a:ext cx="27446760" cy="1306440"/>
           </a:xfrm>
           <a:prstGeom prst="rect">
             <a:avLst/>
@@ -2510,7 +2516,7 @@
         <p:spPr>
           <a:xfrm>
             <a:off x="8130240" y="3825360"/>
-            <a:ext cx="22471920" cy="2391840"/>
+            <a:ext cx="22471560" cy="2391480"/>
           </a:xfrm>
           <a:prstGeom prst="rect">
             <a:avLst/>
@@ -2559,7 +2565,7 @@
         <p:spPr>
           <a:xfrm>
             <a:off x="1553040" y="4125960"/>
-            <a:ext cx="5366520" cy="1611720"/>
+            <a:ext cx="5366160" cy="1611360"/>
           </a:xfrm>
           <a:prstGeom prst="rect">
             <a:avLst/>
@@ -2608,7 +2614,7 @@
         <p:spPr>
           <a:xfrm>
             <a:off x="22684320" y="6947280"/>
-            <a:ext cx="6068880" cy="1140120"/>
+            <a:ext cx="6068520" cy="1139760"/>
           </a:xfrm>
           <a:prstGeom prst="rect">
             <a:avLst/>
@@ -2731,7 +2737,7 @@
         <p:spPr>
           <a:xfrm>
             <a:off x="20482560" y="0"/>
-            <a:ext cx="3015000" cy="4263480"/>
+            <a:ext cx="3014640" cy="4263120"/>
           </a:xfrm>
           <a:prstGeom prst="rect">
             <a:avLst/>
@@ -2754,7 +2760,7 @@
         <p:spPr>
           <a:xfrm>
             <a:off x="24127920" y="624600"/>
-            <a:ext cx="5110920" cy="1826280"/>
+            <a:ext cx="5110560" cy="1825920"/>
           </a:xfrm>
           <a:prstGeom prst="rect">
             <a:avLst/>
@@ -2773,7 +2779,7 @@
         <p:spPr>
           <a:xfrm>
             <a:off x="15727680" y="33689520"/>
-            <a:ext cx="13073400" cy="6027840"/>
+            <a:ext cx="13073040" cy="6027480"/>
           </a:xfrm>
           <a:prstGeom prst="rect">
             <a:avLst/>
@@ -3420,7 +3426,7 @@
         <p:spPr>
           <a:xfrm>
             <a:off x="1463040" y="9900720"/>
-            <a:ext cx="13073400" cy="6005160"/>
+            <a:ext cx="13073040" cy="6004800"/>
           </a:xfrm>
           <a:prstGeom prst="rect">
             <a:avLst/>
@@ -3936,7 +3942,7 @@
         <p:spPr>
           <a:xfrm>
             <a:off x="12444480" y="40105440"/>
-            <a:ext cx="5241960" cy="564480"/>
+            <a:ext cx="5241600" cy="564120"/>
           </a:xfrm>
           <a:prstGeom prst="rect">
             <a:avLst/>
@@ -3980,7 +3986,7 @@
         <p:spPr>
           <a:xfrm>
             <a:off x="1444320" y="17373600"/>
-            <a:ext cx="13073400" cy="2101320"/>
+            <a:ext cx="13073040" cy="2100960"/>
           </a:xfrm>
           <a:prstGeom prst="rect">
             <a:avLst/>
@@ -3999,7 +4005,7 @@
         <p:txBody>
           <a:bodyPr lIns="90000" rIns="90000" tIns="45000" bIns="45000"/>
           <a:p>
-            <a:pPr marL="216000" indent="-214200" algn="just">
+            <a:pPr marL="216000" indent="-213840" algn="just">
               <a:lnSpc>
                 <a:spcPct val="115000"/>
               </a:lnSpc>
@@ -4034,7 +4040,7 @@
             </a:endParaRPr>
           </a:p>
           <a:p>
-            <a:pPr marL="216000" indent="-214200" algn="just">
+            <a:pPr marL="216000" indent="-213840" algn="just">
               <a:lnSpc>
                 <a:spcPct val="115000"/>
               </a:lnSpc>
@@ -4069,7 +4075,7 @@
             </a:endParaRPr>
           </a:p>
           <a:p>
-            <a:pPr marL="216000" indent="-214200" algn="just">
+            <a:pPr marL="216000" indent="-213840" algn="just">
               <a:lnSpc>
                 <a:spcPct val="115000"/>
               </a:lnSpc>
@@ -4104,7 +4110,7 @@
             </a:endParaRPr>
           </a:p>
           <a:p>
-            <a:pPr marL="216000" indent="-214200" algn="just">
+            <a:pPr marL="216000" indent="-213840" algn="just">
               <a:lnSpc>
                 <a:spcPct val="115000"/>
               </a:lnSpc>
@@ -4149,7 +4155,7 @@
         <p:spPr>
           <a:xfrm>
             <a:off x="1573920" y="27886320"/>
-            <a:ext cx="13073400" cy="2924280"/>
+            <a:ext cx="13073040" cy="2923920"/>
           </a:xfrm>
           <a:prstGeom prst="rect">
             <a:avLst/>
@@ -4212,7 +4218,7 @@
         <p:spPr>
           <a:xfrm>
             <a:off x="4708080" y="37500120"/>
-            <a:ext cx="9845640" cy="2037600"/>
+            <a:ext cx="9845280" cy="2037240"/>
           </a:xfrm>
           <a:prstGeom prst="rect">
             <a:avLst/>
@@ -4235,7 +4241,7 @@
         <p:spPr>
           <a:xfrm>
             <a:off x="1142640" y="36836640"/>
-            <a:ext cx="3629880" cy="2564280"/>
+            <a:ext cx="3629520" cy="2563920"/>
           </a:xfrm>
           <a:prstGeom prst="rect">
             <a:avLst/>
@@ -4254,7 +4260,7 @@
         <p:spPr>
           <a:xfrm>
             <a:off x="1905840" y="38615040"/>
-            <a:ext cx="2500920" cy="943560"/>
+            <a:ext cx="2500560" cy="943200"/>
           </a:xfrm>
           <a:prstGeom prst="rect">
             <a:avLst/>
@@ -4307,7 +4313,7 @@
         <p:spPr>
           <a:xfrm>
             <a:off x="17899920" y="13634640"/>
-            <a:ext cx="8862120" cy="11993760"/>
+            <a:ext cx="8861760" cy="11993400"/>
           </a:xfrm>
           <a:prstGeom prst="rect">
             <a:avLst/>
@@ -4326,7 +4332,7 @@
         <p:spPr>
           <a:xfrm>
             <a:off x="23934960" y="19121040"/>
-            <a:ext cx="767520" cy="565200"/>
+            <a:ext cx="767160" cy="564840"/>
           </a:xfrm>
           <a:prstGeom prst="rect">
             <a:avLst/>
@@ -4345,7 +4351,7 @@
         <p:txBody>
           <a:bodyPr lIns="90000" rIns="90000" tIns="45000" bIns="45000"/>
           <a:p>
-            <a:pPr marL="216000" indent="-214200" algn="just">
+            <a:pPr marL="216000" indent="-213840" algn="just">
               <a:lnSpc>
                 <a:spcPct val="115000"/>
               </a:lnSpc>
@@ -4380,7 +4386,7 @@
         <p:spPr>
           <a:xfrm>
             <a:off x="21078000" y="19214640"/>
-            <a:ext cx="767520" cy="565200"/>
+            <a:ext cx="767160" cy="564840"/>
           </a:xfrm>
           <a:prstGeom prst="rect">
             <a:avLst/>
@@ -4399,7 +4405,7 @@
         <p:txBody>
           <a:bodyPr lIns="90000" rIns="90000" tIns="45000" bIns="45000"/>
           <a:p>
-            <a:pPr marL="216000" indent="-214200" algn="just">
+            <a:pPr marL="216000" indent="-213840" algn="just">
               <a:lnSpc>
                 <a:spcPct val="115000"/>
               </a:lnSpc>
@@ -4434,7 +4440,7 @@
         <p:spPr>
           <a:xfrm>
             <a:off x="23610960" y="14909040"/>
-            <a:ext cx="767520" cy="565200"/>
+            <a:ext cx="767160" cy="564840"/>
           </a:xfrm>
           <a:prstGeom prst="rect">
             <a:avLst/>
@@ -4453,7 +4459,7 @@
         <p:txBody>
           <a:bodyPr lIns="90000" rIns="90000" tIns="45000" bIns="45000"/>
           <a:p>
-            <a:pPr marL="216000" indent="-214200" algn="just">
+            <a:pPr marL="216000" indent="-213840" algn="just">
               <a:lnSpc>
                 <a:spcPct val="115000"/>
               </a:lnSpc>
@@ -4488,7 +4494,7 @@
         <p:spPr>
           <a:xfrm>
             <a:off x="19470960" y="24341040"/>
-            <a:ext cx="767520" cy="565200"/>
+            <a:ext cx="767160" cy="564840"/>
           </a:xfrm>
           <a:prstGeom prst="rect">
             <a:avLst/>
@@ -4507,7 +4513,7 @@
         <p:txBody>
           <a:bodyPr lIns="90000" rIns="90000" tIns="45000" bIns="45000"/>
           <a:p>
-            <a:pPr marL="216000" indent="-214200" algn="just">
+            <a:pPr marL="216000" indent="-213840" algn="just">
               <a:lnSpc>
                 <a:spcPct val="115000"/>
               </a:lnSpc>
@@ -4542,7 +4548,7 @@
         <p:spPr>
           <a:xfrm>
             <a:off x="23934960" y="19121040"/>
-            <a:ext cx="767520" cy="565200"/>
+            <a:ext cx="767160" cy="564840"/>
           </a:xfrm>
           <a:prstGeom prst="rect">
             <a:avLst/>
@@ -4561,7 +4567,7 @@
         <p:txBody>
           <a:bodyPr lIns="90000" rIns="90000" tIns="45000" bIns="45000"/>
           <a:p>
-            <a:pPr marL="216000" indent="-214200" algn="just">
+            <a:pPr marL="216000" indent="-213840" algn="just">
               <a:lnSpc>
                 <a:spcPct val="115000"/>
               </a:lnSpc>
@@ -4680,7 +4686,7 @@
         <p:spPr>
           <a:xfrm>
             <a:off x="24143040" y="19805040"/>
-            <a:ext cx="3291120" cy="693720"/>
+            <a:ext cx="3290760" cy="693360"/>
           </a:xfrm>
           <a:prstGeom prst="rect">
             <a:avLst/>
@@ -4729,7 +4735,7 @@
         <p:spPr>
           <a:xfrm>
             <a:off x="21135600" y="14111640"/>
-            <a:ext cx="3194640" cy="730440"/>
+            <a:ext cx="3194280" cy="730080"/>
           </a:xfrm>
           <a:prstGeom prst="rect">
             <a:avLst/>
@@ -4778,7 +4784,7 @@
         <p:spPr>
           <a:xfrm>
             <a:off x="16043040" y="24170760"/>
-            <a:ext cx="2742480" cy="693720"/>
+            <a:ext cx="2742120" cy="693360"/>
           </a:xfrm>
           <a:prstGeom prst="rect">
             <a:avLst/>
@@ -4827,7 +4833,7 @@
         <p:spPr>
           <a:xfrm>
             <a:off x="15757920" y="18783000"/>
-            <a:ext cx="5996160" cy="1329480"/>
+            <a:ext cx="5995800" cy="1329120"/>
           </a:xfrm>
           <a:prstGeom prst="rect">
             <a:avLst/>
@@ -4876,7 +4882,7 @@
         <p:spPr>
           <a:xfrm>
             <a:off x="16925040" y="25245360"/>
-            <a:ext cx="3839760" cy="730800"/>
+            <a:ext cx="3839400" cy="730440"/>
           </a:xfrm>
           <a:prstGeom prst="rect">
             <a:avLst/>
@@ -4925,7 +4931,7 @@
         <p:spPr>
           <a:xfrm>
             <a:off x="24499440" y="19221120"/>
-            <a:ext cx="3926160" cy="730800"/>
+            <a:ext cx="3925800" cy="730440"/>
           </a:xfrm>
           <a:prstGeom prst="rect">
             <a:avLst/>
@@ -4974,7 +4980,7 @@
         <p:spPr>
           <a:xfrm>
             <a:off x="21564720" y="13579920"/>
-            <a:ext cx="3839760" cy="822240"/>
+            <a:ext cx="3839400" cy="821880"/>
           </a:xfrm>
           <a:prstGeom prst="rect">
             <a:avLst/>
@@ -5023,7 +5029,7 @@
         <p:spPr>
           <a:xfrm>
             <a:off x="16128000" y="19992960"/>
-            <a:ext cx="2833920" cy="822960"/>
+            <a:ext cx="2833560" cy="822600"/>
           </a:xfrm>
           <a:prstGeom prst="rect">
             <a:avLst/>
@@ -5072,7 +5078,7 @@
         <p:spPr>
           <a:xfrm>
             <a:off x="16385040" y="24705360"/>
-            <a:ext cx="3199680" cy="682560"/>
+            <a:ext cx="3199320" cy="682200"/>
           </a:xfrm>
           <a:prstGeom prst="rect">
             <a:avLst/>
@@ -5125,7 +5131,7 @@
         <p:spPr>
           <a:xfrm>
             <a:off x="7680960" y="41129640"/>
-            <a:ext cx="1463400" cy="1644120"/>
+            <a:ext cx="1463040" cy="1643760"/>
           </a:xfrm>
           <a:prstGeom prst="rect">
             <a:avLst/>
@@ -5148,7 +5154,7 @@
         <p:spPr>
           <a:xfrm>
             <a:off x="1621800" y="41239440"/>
-            <a:ext cx="1946520" cy="1352160"/>
+            <a:ext cx="1946160" cy="1351800"/>
           </a:xfrm>
           <a:prstGeom prst="rect">
             <a:avLst/>
@@ -5171,7 +5177,7 @@
         <p:spPr>
           <a:xfrm>
             <a:off x="3775320" y="41239440"/>
-            <a:ext cx="1989360" cy="1370880"/>
+            <a:ext cx="1989000" cy="1370520"/>
           </a:xfrm>
           <a:prstGeom prst="rect">
             <a:avLst/>
@@ -5190,7 +5196,7 @@
         <p:spPr>
           <a:xfrm>
             <a:off x="24827760" y="25500960"/>
-            <a:ext cx="3657240" cy="1163160"/>
+            <a:ext cx="3656880" cy="1162800"/>
           </a:xfrm>
           <a:prstGeom prst="rect">
             <a:avLst/>
@@ -5258,8 +5264,8 @@
         </p:nvSpPr>
         <p:spPr>
           <a:xfrm>
-            <a:off x="15639120" y="9876960"/>
-            <a:ext cx="13073400" cy="2101320"/>
+            <a:off x="15711120" y="9876960"/>
+            <a:ext cx="12890160" cy="2100960"/>
           </a:xfrm>
           <a:prstGeom prst="rect">
             <a:avLst/>
@@ -5278,7 +5284,7 @@
         <p:txBody>
           <a:bodyPr lIns="90000" rIns="90000" tIns="45000" bIns="45000"/>
           <a:p>
-            <a:pPr marL="216000" indent="-214200" algn="just">
+            <a:pPr marL="216000" indent="-213840" algn="just">
               <a:lnSpc>
                 <a:spcPct val="115000"/>
               </a:lnSpc>
@@ -5313,7 +5319,7 @@
             </a:endParaRPr>
           </a:p>
           <a:p>
-            <a:pPr marL="216000" indent="-214200" algn="just">
+            <a:pPr marL="216000" indent="-213840" algn="just">
               <a:lnSpc>
                 <a:spcPct val="115000"/>
               </a:lnSpc>
@@ -5348,7 +5354,7 @@
             </a:endParaRPr>
           </a:p>
           <a:p>
-            <a:pPr marL="216000" indent="-214200" algn="just">
+            <a:pPr marL="216000" indent="-213840" algn="just">
               <a:lnSpc>
                 <a:spcPct val="115000"/>
               </a:lnSpc>
@@ -5383,7 +5389,7 @@
             </a:endParaRPr>
           </a:p>
           <a:p>
-            <a:pPr marL="216000" indent="-214200" algn="just">
+            <a:pPr marL="216000" indent="-213840" algn="just">
               <a:lnSpc>
                 <a:spcPct val="115000"/>
               </a:lnSpc>
@@ -5428,7 +5434,7 @@
         <p:spPr>
           <a:xfrm>
             <a:off x="18273240" y="12452760"/>
-            <a:ext cx="8046000" cy="822240"/>
+            <a:ext cx="8045640" cy="821880"/>
           </a:xfrm>
           <a:prstGeom prst="rect">
             <a:avLst/>
@@ -5477,7 +5483,7 @@
         <p:spPr>
           <a:xfrm>
             <a:off x="1463040" y="9900720"/>
-            <a:ext cx="13073400" cy="6005160"/>
+            <a:ext cx="13073040" cy="6004800"/>
           </a:xfrm>
           <a:prstGeom prst="rect">
             <a:avLst/>
@@ -5525,7 +5531,7 @@
         </p:nvGraphicFramePr>
         <p:xfrm>
           <a:off x="1497240" y="32440320"/>
-          <a:ext cx="13041000" cy="4049280"/>
+          <a:ext cx="13041000" cy="4047120"/>
         </p:xfrm>
         <a:graphic>
           <a:graphicData uri="http://schemas.openxmlformats.org/drawingml/2006/table">
@@ -5538,9 +5544,9 @@
               <a:tr h="567000">
                 <a:tc>
                   <a:txBody>
-                    <a:bodyPr lIns="90000" rIns="90000" anchor="ctr"/>
+                    <a:bodyPr lIns="90000" rIns="90000"/>
                     <a:p>
-                      <a:pPr marL="216000" indent="-215640">
+                      <a:pPr marL="216000" indent="-215280">
                         <a:lnSpc>
                           <a:spcPct val="100000"/>
                         </a:lnSpc>
@@ -5586,7 +5592,7 @@
               <a:tr h="567360">
                 <a:tc>
                   <a:txBody>
-                    <a:bodyPr lIns="90000" rIns="90000" anchor="ctr"/>
+                    <a:bodyPr lIns="90000" rIns="90000"/>
                     <a:p>
                       <a:pPr algn="r">
                         <a:lnSpc>
@@ -5615,7 +5621,7 @@
                 </a:tc>
                 <a:tc>
                   <a:txBody>
-                    <a:bodyPr lIns="90000" rIns="90000" anchor="ctr"/>
+                    <a:bodyPr lIns="90000" rIns="90000"/>
                     <a:p>
                       <a:pPr>
                         <a:lnSpc>
@@ -5671,9 +5677,9 @@
               <a:tr h="590760">
                 <a:tc>
                   <a:txBody>
-                    <a:bodyPr lIns="90000" rIns="90000" anchor="ctr"/>
+                    <a:bodyPr lIns="90000" rIns="90000"/>
                     <a:p>
-                      <a:pPr marL="216000" indent="-215640">
+                      <a:pPr marL="216000" indent="-215280">
                         <a:lnSpc>
                           <a:spcPct val="100000"/>
                         </a:lnSpc>
@@ -5719,7 +5725,7 @@
               <a:tr h="1518480">
                 <a:tc>
                   <a:txBody>
-                    <a:bodyPr lIns="90000" rIns="90000" anchor="ctr"/>
+                    <a:bodyPr lIns="90000" rIns="90000"/>
                     <a:p>
                       <a:pPr algn="r">
                         <a:lnSpc>
@@ -5786,7 +5792,7 @@
                 </a:tc>
                 <a:tc>
                   <a:txBody>
-                    <a:bodyPr lIns="90000" rIns="90000" anchor="ctr"/>
+                    <a:bodyPr lIns="90000" rIns="90000"/>
                     <a:p>
                       <a:pPr>
                         <a:lnSpc>
@@ -5896,7 +5902,7 @@
         <p:spPr>
           <a:xfrm>
             <a:off x="1578960" y="19699560"/>
-            <a:ext cx="13087440" cy="8079120"/>
+            <a:ext cx="13087080" cy="8078760"/>
           </a:xfrm>
           <a:prstGeom prst="rect">
             <a:avLst/>

</xml_diff>

<commit_message>
fixed de.STAIR training event end date
</commit_message>
<xml_diff>
--- a/poster.pptx
+++ b/poster.pptx
@@ -192,7 +192,7 @@
           <a:bodyPr lIns="0" rIns="0" tIns="0" bIns="0" anchor="b"/>
           <a:p>
             <a:pPr algn="r"/>
-            <a:fld id="{EDB44EF4-F34F-422A-ADED-349C24EB0097}" type="slidenum">
+            <a:fld id="{6DF81A49-67D4-4427-9293-EEA64FD6FE9F}" type="slidenum">
               <a:rPr b="0" lang="en-US" sz="1400" spc="-1" strike="noStrike">
                 <a:latin typeface="Times New Roman"/>
               </a:rPr>
@@ -288,7 +288,7 @@
                 <a:spcPct val="100000"/>
               </a:lnSpc>
             </a:pPr>
-            <a:fld id="{39FD96EC-9FB1-4925-93AF-4FF3A7602AD1}" type="slidenum">
+            <a:fld id="{8FD6D6BD-B2F7-422F-A156-10FA4A54EF46}" type="slidenum">
               <a:rPr b="0" lang="en-US" sz="1200" spc="-1" strike="noStrike">
                 <a:solidFill>
                   <a:srgbClr val="000000"/>
@@ -296,7 +296,7 @@
                 <a:latin typeface="+mn-lt"/>
                 <a:ea typeface="+mn-ea"/>
               </a:rPr>
-              <a:t>1</a:t>
+              <a:t>&lt;number&gt;</a:t>
             </a:fld>
             <a:endParaRPr b="0" lang="en-US" sz="1200" spc="-1" strike="noStrike">
               <a:latin typeface="Arial"/>
@@ -1692,13 +1692,7 @@
               <a:rPr b="0" lang="en-US" sz="4400" spc="-1" strike="noStrike">
                 <a:latin typeface="Arial"/>
               </a:rPr>
-              <a:t>Click to edit the title </a:t>
-            </a:r>
-            <a:r>
-              <a:rPr b="0" lang="en-US" sz="4400" spc="-1" strike="noStrike">
-                <a:latin typeface="Arial"/>
-              </a:rPr>
-              <a:t>text format</a:t>
+              <a:t>Click to edit the title text format</a:t>
             </a:r>
             <a:endParaRPr b="0" lang="en-US" sz="4400" spc="-1" strike="noStrike">
               <a:latin typeface="Arial"/>
@@ -3895,7 +3889,7 @@
                           </a:solidFill>
                           <a:latin typeface="Cambria"/>
                         </a:rPr>
-                        <a:t>04.10.2017 – 08.10.2017</a:t>
+                        <a:t>04.10.2017 – 06.10.2017</a:t>
                       </a:r>
                       <a:endParaRPr b="0" lang="en-US" sz="3200" spc="-1" strike="noStrike">
                         <a:latin typeface="Arial"/>

</xml_diff>

<commit_message>
shifted 'Galaxy tours' on Rostock
</commit_message>
<xml_diff>
--- a/poster.pptx
+++ b/poster.pptx
@@ -192,7 +192,7 @@
           <a:bodyPr lIns="0" rIns="0" tIns="0" bIns="0" anchor="b"/>
           <a:p>
             <a:pPr algn="r"/>
-            <a:fld id="{6DF81A49-67D4-4427-9293-EEA64FD6FE9F}" type="slidenum">
+            <a:fld id="{02F8254E-EB18-4787-8844-F1735DFC9C5D}" type="slidenum">
               <a:rPr b="0" lang="en-US" sz="1400" spc="-1" strike="noStrike">
                 <a:latin typeface="Times New Roman"/>
               </a:rPr>
@@ -288,7 +288,7 @@
                 <a:spcPct val="100000"/>
               </a:lnSpc>
             </a:pPr>
-            <a:fld id="{8FD6D6BD-B2F7-422F-A156-10FA4A54EF46}" type="slidenum">
+            <a:fld id="{93A9D008-577E-49A3-BEBD-D5009B42AEB2}" type="slidenum">
               <a:rPr b="0" lang="en-US" sz="1200" spc="-1" strike="noStrike">
                 <a:solidFill>
                   <a:srgbClr val="000000"/>
@@ -296,7 +296,7 @@
                 <a:latin typeface="+mn-lt"/>
                 <a:ea typeface="+mn-ea"/>
               </a:rPr>
-              <a:t>&lt;number&gt;</a:t>
+              <a:t>1</a:t>
             </a:fld>
             <a:endParaRPr b="0" lang="en-US" sz="1200" spc="-1" strike="noStrike">
               <a:latin typeface="Arial"/>
@@ -1692,7 +1692,13 @@
               <a:rPr b="0" lang="en-US" sz="4400" spc="-1" strike="noStrike">
                 <a:latin typeface="Arial"/>
               </a:rPr>
-              <a:t>Click to edit the title text format</a:t>
+              <a:t>Click to edit the title </a:t>
+            </a:r>
+            <a:r>
+              <a:rPr b="0" lang="en-US" sz="4400" spc="-1" strike="noStrike">
+                <a:latin typeface="Arial"/>
+              </a:rPr>
+              <a:t>text format</a:t>
             </a:r>
             <a:endParaRPr b="0" lang="en-US" sz="4400" spc="-1" strike="noStrike">
               <a:latin typeface="Arial"/>
@@ -4728,7 +4734,7 @@
         </p:nvSpPr>
         <p:spPr>
           <a:xfrm>
-            <a:off x="21135600" y="14111640"/>
+            <a:off x="20991600" y="14111640"/>
             <a:ext cx="3194280" cy="730080"/>
           </a:xfrm>
           <a:prstGeom prst="rect">

</xml_diff>